<commit_message>
Made changes for 2024, 2FA instead of SSH
</commit_message>
<xml_diff>
--- a/introGit.pptx
+++ b/introGit.pptx
@@ -7,11 +7,11 @@
   <p:sldIdLst>
     <p:sldId id="256" r:id="rId2"/>
     <p:sldId id="257" r:id="rId3"/>
-    <p:sldId id="259" r:id="rId4"/>
-    <p:sldId id="260" r:id="rId5"/>
-    <p:sldId id="261" r:id="rId6"/>
-    <p:sldId id="262" r:id="rId7"/>
-    <p:sldId id="263" r:id="rId8"/>
+    <p:sldId id="277" r:id="rId4"/>
+    <p:sldId id="259" r:id="rId5"/>
+    <p:sldId id="260" r:id="rId6"/>
+    <p:sldId id="261" r:id="rId7"/>
+    <p:sldId id="262" r:id="rId8"/>
     <p:sldId id="258" r:id="rId9"/>
     <p:sldId id="264" r:id="rId10"/>
     <p:sldId id="265" r:id="rId11"/>
@@ -25,7 +25,9 @@
     <p:sldId id="273" r:id="rId19"/>
     <p:sldId id="274" r:id="rId20"/>
     <p:sldId id="275" r:id="rId21"/>
-    <p:sldId id="276" r:id="rId22"/>
+    <p:sldId id="279" r:id="rId22"/>
+    <p:sldId id="278" r:id="rId23"/>
+    <p:sldId id="276" r:id="rId24"/>
   </p:sldIdLst>
   <p:sldSz cx="12192000" cy="6858000"/>
   <p:notesSz cx="6858000" cy="9144000"/>
@@ -124,15 +126,12 @@
       </a:defRPr>
     </a:lvl9pPr>
   </p:defaultTextStyle>
+  <p:extLst>
+    <p:ext uri="{EFAFB233-063F-42B5-8137-9DF3F51BA10A}">
+      <p15:sldGuideLst xmlns:p15="http://schemas.microsoft.com/office/powerpoint/2012/main"/>
+    </p:ext>
+  </p:extLst>
 </p:presentation>
-</file>
-
-<file path=ppt/revisionInfo.xml><?xml version="1.0" encoding="utf-8"?>
-<p1510:revInfo xmlns:a="http://schemas.openxmlformats.org/drawingml/2006/main" xmlns:r="http://schemas.openxmlformats.org/officeDocument/2006/relationships" xmlns:p1510="http://schemas.microsoft.com/office/powerpoint/2015/10/main">
-  <p1510:revLst>
-    <p1510:client id="{0DC1AFB2-A34C-EC4D-B791-BE0E02FCE42E}" v="8" dt="2023-06-23T17:27:50.258"/>
-  </p1510:revLst>
-</p1510:revInfo>
 </file>
 
 <file path=ppt/slideLayouts/slideLayout1.xml><?xml version="1.0" encoding="utf-8"?>
@@ -282,7 +281,7 @@
           <a:p>
             <a:fld id="{7846FA0B-E166-DB47-BA99-28CF4B4448A1}" type="datetimeFigureOut">
               <a:rPr lang="en-US" smtClean="0"/>
-              <a:t>6/23/23</a:t>
+              <a:t>1/24/24</a:t>
             </a:fld>
             <a:endParaRPr lang="en-US"/>
           </a:p>
@@ -480,7 +479,7 @@
           <a:p>
             <a:fld id="{7846FA0B-E166-DB47-BA99-28CF4B4448A1}" type="datetimeFigureOut">
               <a:rPr lang="en-US" smtClean="0"/>
-              <a:t>6/23/23</a:t>
+              <a:t>1/24/24</a:t>
             </a:fld>
             <a:endParaRPr lang="en-US"/>
           </a:p>
@@ -688,7 +687,7 @@
           <a:p>
             <a:fld id="{7846FA0B-E166-DB47-BA99-28CF4B4448A1}" type="datetimeFigureOut">
               <a:rPr lang="en-US" smtClean="0"/>
-              <a:t>6/23/23</a:t>
+              <a:t>1/24/24</a:t>
             </a:fld>
             <a:endParaRPr lang="en-US"/>
           </a:p>
@@ -886,7 +885,7 @@
           <a:p>
             <a:fld id="{7846FA0B-E166-DB47-BA99-28CF4B4448A1}" type="datetimeFigureOut">
               <a:rPr lang="en-US" smtClean="0"/>
-              <a:t>6/23/23</a:t>
+              <a:t>1/24/24</a:t>
             </a:fld>
             <a:endParaRPr lang="en-US"/>
           </a:p>
@@ -1161,7 +1160,7 @@
           <a:p>
             <a:fld id="{7846FA0B-E166-DB47-BA99-28CF4B4448A1}" type="datetimeFigureOut">
               <a:rPr lang="en-US" smtClean="0"/>
-              <a:t>6/23/23</a:t>
+              <a:t>1/24/24</a:t>
             </a:fld>
             <a:endParaRPr lang="en-US"/>
           </a:p>
@@ -1426,7 +1425,7 @@
           <a:p>
             <a:fld id="{7846FA0B-E166-DB47-BA99-28CF4B4448A1}" type="datetimeFigureOut">
               <a:rPr lang="en-US" smtClean="0"/>
-              <a:t>6/23/23</a:t>
+              <a:t>1/24/24</a:t>
             </a:fld>
             <a:endParaRPr lang="en-US"/>
           </a:p>
@@ -1838,7 +1837,7 @@
           <a:p>
             <a:fld id="{7846FA0B-E166-DB47-BA99-28CF4B4448A1}" type="datetimeFigureOut">
               <a:rPr lang="en-US" smtClean="0"/>
-              <a:t>6/23/23</a:t>
+              <a:t>1/24/24</a:t>
             </a:fld>
             <a:endParaRPr lang="en-US"/>
           </a:p>
@@ -1979,7 +1978,7 @@
           <a:p>
             <a:fld id="{7846FA0B-E166-DB47-BA99-28CF4B4448A1}" type="datetimeFigureOut">
               <a:rPr lang="en-US" smtClean="0"/>
-              <a:t>6/23/23</a:t>
+              <a:t>1/24/24</a:t>
             </a:fld>
             <a:endParaRPr lang="en-US"/>
           </a:p>
@@ -2092,7 +2091,7 @@
           <a:p>
             <a:fld id="{7846FA0B-E166-DB47-BA99-28CF4B4448A1}" type="datetimeFigureOut">
               <a:rPr lang="en-US" smtClean="0"/>
-              <a:t>6/23/23</a:t>
+              <a:t>1/24/24</a:t>
             </a:fld>
             <a:endParaRPr lang="en-US"/>
           </a:p>
@@ -2403,7 +2402,7 @@
           <a:p>
             <a:fld id="{7846FA0B-E166-DB47-BA99-28CF4B4448A1}" type="datetimeFigureOut">
               <a:rPr lang="en-US" smtClean="0"/>
-              <a:t>6/23/23</a:t>
+              <a:t>1/24/24</a:t>
             </a:fld>
             <a:endParaRPr lang="en-US"/>
           </a:p>
@@ -2691,7 +2690,7 @@
           <a:p>
             <a:fld id="{7846FA0B-E166-DB47-BA99-28CF4B4448A1}" type="datetimeFigureOut">
               <a:rPr lang="en-US" smtClean="0"/>
-              <a:t>6/23/23</a:t>
+              <a:t>1/24/24</a:t>
             </a:fld>
             <a:endParaRPr lang="en-US"/>
           </a:p>
@@ -2932,7 +2931,7 @@
           <a:p>
             <a:fld id="{7846FA0B-E166-DB47-BA99-28CF4B4448A1}" type="datetimeFigureOut">
               <a:rPr lang="en-US" smtClean="0"/>
-              <a:t>6/23/23</a:t>
+              <a:t>1/24/24</a:t>
             </a:fld>
             <a:endParaRPr lang="en-US"/>
           </a:p>
@@ -3401,7 +3400,7 @@
         <p:spPr>
           <a:xfrm>
             <a:off x="1020417" y="2157551"/>
-            <a:ext cx="10151165" cy="3905319"/>
+            <a:ext cx="10151165" cy="4190240"/>
           </a:xfrm>
         </p:spPr>
         <p:txBody>
@@ -3466,7 +3465,20 @@
           <a:p>
             <a:r>
               <a:rPr lang="en-US" dirty="0"/>
-              <a:t>Then, open up Terminal or </a:t>
+              <a:t>Then, download the repo here: </a:t>
+            </a:r>
+            <a:r>
+              <a:rPr lang="en-US" dirty="0">
+                <a:hlinkClick r:id="rId3"/>
+              </a:rPr>
+              <a:t>https://github.com/nuitrcs/introGit</a:t>
+            </a:r>
+            <a:endParaRPr lang="en-US" dirty="0"/>
+          </a:p>
+          <a:p>
+            <a:r>
+              <a:rPr lang="en-US" dirty="0"/>
+              <a:t>Then, open up Terminal (Mac) or </a:t>
             </a:r>
             <a:r>
               <a:rPr lang="en-US" dirty="0" err="1"/>
@@ -3474,7 +3486,7 @@
             </a:r>
             <a:r>
               <a:rPr lang="en-US" dirty="0"/>
-              <a:t>.</a:t>
+              <a:t> (Windows).</a:t>
             </a:r>
           </a:p>
           <a:p>
@@ -3694,7 +3706,18 @@
               <a:rPr lang="en-US" dirty="0">
                 <a:latin typeface="Andale Mono" panose="020B0509000000000004" pitchFamily="49" charset="0"/>
               </a:rPr>
-              <a:t>Do you remember which flag to use to show you any hidden files and directories?</a:t>
+              <a:t>CHECK WHAT’S IN YOUR REPO (including hidden files)</a:t>
+            </a:r>
+          </a:p>
+          <a:p>
+            <a:pPr marL="0" indent="0">
+              <a:buNone/>
+            </a:pPr>
+            <a:r>
+              <a:rPr lang="en-US" dirty="0">
+                <a:latin typeface="Andale Mono" panose="020B0509000000000004" pitchFamily="49" charset="0"/>
+              </a:rPr>
+              <a:t>$ ls -a</a:t>
             </a:r>
           </a:p>
         </p:txBody>
@@ -3848,36 +3871,42 @@
         </p:nvSpPr>
         <p:spPr/>
         <p:txBody>
-          <a:bodyPr/>
-          <a:lstStyle/>
-          <a:p>
-            <a:r>
-              <a:rPr lang="en-US" dirty="0"/>
-              <a:t>Make changes in your repo</a:t>
-            </a:r>
-          </a:p>
-        </p:txBody>
-      </p:sp>
-      <p:sp>
-        <p:nvSpPr>
-          <p:cNvPr id="3" name="Content Placeholder 2">
-            <a:extLst>
-              <a:ext uri="{FF2B5EF4-FFF2-40B4-BE49-F238E27FC236}">
-                <a16:creationId xmlns:a16="http://schemas.microsoft.com/office/drawing/2014/main" id="{9A302AED-281C-0BC2-DA90-D64BAE428DA5}"/>
-              </a:ext>
-            </a:extLst>
-          </p:cNvPr>
-          <p:cNvSpPr>
-            <a:spLocks noGrp="1"/>
-          </p:cNvSpPr>
-          <p:nvPr>
-            <p:ph idx="1"/>
-          </p:nvPr>
-        </p:nvSpPr>
-        <p:spPr/>
-        <p:txBody>
           <a:bodyPr>
             <a:normAutofit/>
+          </a:bodyPr>
+          <a:lstStyle/>
+          <a:p>
+            <a:r>
+              <a:rPr lang="en-US" dirty="0"/>
+              <a:t>Make changes in your repo </a:t>
+            </a:r>
+            <a:r>
+              <a:rPr lang="en-US" sz="3100" dirty="0"/>
+              <a:t>(this code is for the vi text editor, or you can use the text editor of your choice)</a:t>
+            </a:r>
+          </a:p>
+        </p:txBody>
+      </p:sp>
+      <p:sp>
+        <p:nvSpPr>
+          <p:cNvPr id="3" name="Content Placeholder 2">
+            <a:extLst>
+              <a:ext uri="{FF2B5EF4-FFF2-40B4-BE49-F238E27FC236}">
+                <a16:creationId xmlns:a16="http://schemas.microsoft.com/office/drawing/2014/main" id="{9A302AED-281C-0BC2-DA90-D64BAE428DA5}"/>
+              </a:ext>
+            </a:extLst>
+          </p:cNvPr>
+          <p:cNvSpPr>
+            <a:spLocks noGrp="1"/>
+          </p:cNvSpPr>
+          <p:nvPr>
+            <p:ph idx="1"/>
+          </p:nvPr>
+        </p:nvSpPr>
+        <p:spPr/>
+        <p:txBody>
+          <a:bodyPr>
+            <a:normAutofit lnSpcReduction="10000"/>
           </a:bodyPr>
           <a:lstStyle/>
           <a:p>
@@ -3974,6 +4003,15 @@
               <a:buNone/>
             </a:pPr>
             <a:endParaRPr lang="en-US" dirty="0"/>
+          </a:p>
+          <a:p>
+            <a:pPr marL="0" indent="0">
+              <a:buNone/>
+            </a:pPr>
+            <a:r>
+              <a:rPr lang="en-US" dirty="0"/>
+              <a:t>Check the staging area:</a:t>
+            </a:r>
           </a:p>
           <a:p>
             <a:pPr marL="0" indent="0">
@@ -4115,78 +4153,6 @@
             <a:pPr marL="0" indent="0">
               <a:buNone/>
             </a:pPr>
-            <a:r>
-              <a:rPr lang="en-US" sz="2400" dirty="0">
-                <a:latin typeface="Andale Mono" panose="020B0509000000000004" pitchFamily="49" charset="0"/>
-              </a:rPr>
-              <a:t>Enter “</a:t>
-            </a:r>
-            <a:r>
-              <a:rPr lang="en-US" sz="2400" dirty="0" err="1">
-                <a:latin typeface="Andale Mono" panose="020B0509000000000004" pitchFamily="49" charset="0"/>
-              </a:rPr>
-              <a:t>i</a:t>
-            </a:r>
-            <a:r>
-              <a:rPr lang="en-US" sz="2400" dirty="0">
-                <a:latin typeface="Andale Mono" panose="020B0509000000000004" pitchFamily="49" charset="0"/>
-              </a:rPr>
-              <a:t>” and then add this text to the text file:</a:t>
-            </a:r>
-          </a:p>
-          <a:p>
-            <a:pPr marL="0" indent="0">
-              <a:buNone/>
-            </a:pPr>
-            <a:r>
-              <a:rPr lang="en-US" dirty="0"/>
-              <a:t>Cold and dry, but everything is my favorite color</a:t>
-            </a:r>
-          </a:p>
-          <a:p>
-            <a:pPr marL="0" indent="0">
-              <a:buNone/>
-            </a:pPr>
-            <a:r>
-              <a:rPr lang="en-US" sz="2400" dirty="0">
-                <a:latin typeface="Andale Mono" panose="020B0509000000000004" pitchFamily="49" charset="0"/>
-              </a:rPr>
-              <a:t>Press the esc key and then enter “:</a:t>
-            </a:r>
-            <a:r>
-              <a:rPr lang="en-US" sz="2400" dirty="0" err="1">
-                <a:latin typeface="Andale Mono" panose="020B0509000000000004" pitchFamily="49" charset="0"/>
-              </a:rPr>
-              <a:t>wq</a:t>
-            </a:r>
-            <a:r>
-              <a:rPr lang="en-US" sz="2400" dirty="0">
-                <a:latin typeface="Andale Mono" panose="020B0509000000000004" pitchFamily="49" charset="0"/>
-              </a:rPr>
-              <a:t>” to save your changes.</a:t>
-            </a:r>
-          </a:p>
-          <a:p>
-            <a:pPr marL="0" indent="0">
-              <a:buNone/>
-            </a:pPr>
-            <a:endParaRPr lang="en-US" dirty="0"/>
-          </a:p>
-          <a:p>
-            <a:pPr marL="0" indent="0">
-              <a:buNone/>
-            </a:pPr>
-            <a:r>
-              <a:rPr lang="en-US" dirty="0">
-                <a:latin typeface="Andale Mono" panose="020B0509000000000004" pitchFamily="49" charset="0"/>
-              </a:rPr>
-              <a:t>$ git status</a:t>
-            </a:r>
-          </a:p>
-          <a:p>
-            <a:pPr marL="0" indent="0">
-              <a:buNone/>
-            </a:pPr>
             <a:endParaRPr lang="en-US" dirty="0"/>
           </a:p>
         </p:txBody>
@@ -4773,7 +4739,7 @@
             </a:pPr>
             <a:r>
               <a:rPr lang="en-US" dirty="0"/>
-              <a:t>Run the code given to you on GitHub to push an existing repo.</a:t>
+              <a:t>Choose HTTPS and run the code given to you on GitHub to push an existing repo.</a:t>
             </a:r>
           </a:p>
           <a:p>
@@ -4895,7 +4861,7 @@
           <a:p>
             <a:r>
               <a:rPr lang="en-US" dirty="0"/>
-              <a:t>Get your git linked to your GitHub – this requires setting up an SSH key on your laptop to meet GitHub’s security requirements</a:t>
+              <a:t>Get your git linked to your GitHub – this requires setting up 2FA to meet GitHub’s security requirements</a:t>
             </a:r>
           </a:p>
           <a:p>
@@ -5101,6 +5067,548 @@
   <p:cSld>
     <p:spTree>
       <p:nvGrpSpPr>
+        <p:cNvPr id="1" name="">
+          <a:extLst>
+            <a:ext uri="{FF2B5EF4-FFF2-40B4-BE49-F238E27FC236}">
+              <a16:creationId xmlns:a16="http://schemas.microsoft.com/office/drawing/2014/main" id="{E29AAFBD-F834-2285-B106-7579A40617A9}"/>
+            </a:ext>
+          </a:extLst>
+        </p:cNvPr>
+        <p:cNvGrpSpPr/>
+        <p:nvPr/>
+      </p:nvGrpSpPr>
+      <p:grpSpPr>
+        <a:xfrm>
+          <a:off x="0" y="0"/>
+          <a:ext cx="0" cy="0"/>
+          <a:chOff x="0" y="0"/>
+          <a:chExt cx="0" cy="0"/>
+        </a:xfrm>
+      </p:grpSpPr>
+      <p:sp>
+        <p:nvSpPr>
+          <p:cNvPr id="2" name="Title 1">
+            <a:extLst>
+              <a:ext uri="{FF2B5EF4-FFF2-40B4-BE49-F238E27FC236}">
+                <a16:creationId xmlns:a16="http://schemas.microsoft.com/office/drawing/2014/main" id="{39D86B68-4F7E-31BF-108E-9C7DEA37695C}"/>
+              </a:ext>
+            </a:extLst>
+          </p:cNvPr>
+          <p:cNvSpPr>
+            <a:spLocks noGrp="1"/>
+          </p:cNvSpPr>
+          <p:nvPr>
+            <p:ph type="title"/>
+          </p:nvPr>
+        </p:nvSpPr>
+        <p:spPr/>
+        <p:txBody>
+          <a:bodyPr/>
+          <a:lstStyle/>
+          <a:p>
+            <a:r>
+              <a:rPr lang="en-US" dirty="0"/>
+              <a:t>DIY again, if you want more practice</a:t>
+            </a:r>
+          </a:p>
+        </p:txBody>
+      </p:sp>
+      <p:sp>
+        <p:nvSpPr>
+          <p:cNvPr id="3" name="Content Placeholder 2">
+            <a:extLst>
+              <a:ext uri="{FF2B5EF4-FFF2-40B4-BE49-F238E27FC236}">
+                <a16:creationId xmlns:a16="http://schemas.microsoft.com/office/drawing/2014/main" id="{EB8D6C09-4401-ED75-D771-13AF0201FC4E}"/>
+              </a:ext>
+            </a:extLst>
+          </p:cNvPr>
+          <p:cNvSpPr>
+            <a:spLocks noGrp="1"/>
+          </p:cNvSpPr>
+          <p:nvPr>
+            <p:ph idx="1"/>
+          </p:nvPr>
+        </p:nvSpPr>
+        <p:spPr/>
+        <p:txBody>
+          <a:bodyPr>
+            <a:normAutofit/>
+          </a:bodyPr>
+          <a:lstStyle/>
+          <a:p>
+            <a:pPr marL="0" indent="0">
+              <a:buNone/>
+            </a:pPr>
+            <a:r>
+              <a:rPr lang="en-US" dirty="0"/>
+              <a:t>Add text to the “apollo-11.txt” file.</a:t>
+            </a:r>
+          </a:p>
+          <a:p>
+            <a:pPr marL="0" indent="0">
+              <a:buNone/>
+            </a:pPr>
+            <a:endParaRPr lang="en-US" dirty="0"/>
+          </a:p>
+          <a:p>
+            <a:pPr marL="0" indent="0">
+              <a:buNone/>
+            </a:pPr>
+            <a:r>
+              <a:rPr lang="en-US" dirty="0"/>
+              <a:t>Add the new file to the staging area, make a commit (with a message), and then push the changes to your remote repo with this line of code:</a:t>
+            </a:r>
+          </a:p>
+          <a:p>
+            <a:pPr marL="0" indent="0">
+              <a:buNone/>
+            </a:pPr>
+            <a:r>
+              <a:rPr lang="en-US" dirty="0">
+                <a:latin typeface="Andale Mono" panose="020B0509000000000004" pitchFamily="49" charset="0"/>
+              </a:rPr>
+              <a:t>$ git push –u origin main</a:t>
+            </a:r>
+          </a:p>
+          <a:p>
+            <a:pPr marL="0" indent="0">
+              <a:buNone/>
+            </a:pPr>
+            <a:r>
+              <a:rPr lang="en-US" dirty="0"/>
+              <a:t>The –u helps deal with those pesky line endings, plus other character inconsistencies between operating systems.</a:t>
+            </a:r>
+          </a:p>
+          <a:p>
+            <a:pPr marL="0" indent="0">
+              <a:buNone/>
+            </a:pPr>
+            <a:endParaRPr lang="en-US" dirty="0"/>
+          </a:p>
+          <a:p>
+            <a:pPr marL="0" indent="0">
+              <a:buNone/>
+            </a:pPr>
+            <a:endParaRPr lang="en-US" dirty="0">
+              <a:latin typeface="Andale Mono" panose="020B0509000000000004" pitchFamily="49" charset="0"/>
+            </a:endParaRPr>
+          </a:p>
+          <a:p>
+            <a:pPr marL="0" indent="0">
+              <a:buNone/>
+            </a:pPr>
+            <a:endParaRPr lang="en-US" dirty="0">
+              <a:latin typeface="Andale Mono" panose="020B0509000000000004" pitchFamily="49" charset="0"/>
+            </a:endParaRPr>
+          </a:p>
+        </p:txBody>
+      </p:sp>
+    </p:spTree>
+    <p:extLst>
+      <p:ext uri="{BB962C8B-B14F-4D97-AF65-F5344CB8AC3E}">
+        <p14:creationId xmlns:p14="http://schemas.microsoft.com/office/powerpoint/2010/main" val="2262449849"/>
+      </p:ext>
+    </p:extLst>
+  </p:cSld>
+  <p:clrMapOvr>
+    <a:masterClrMapping/>
+  </p:clrMapOvr>
+</p:sld>
+</file>
+
+<file path=ppt/slides/slide22.xml><?xml version="1.0" encoding="utf-8"?>
+<p:sld xmlns:a="http://schemas.openxmlformats.org/drawingml/2006/main" xmlns:r="http://schemas.openxmlformats.org/officeDocument/2006/relationships" xmlns:p="http://schemas.openxmlformats.org/presentationml/2006/main">
+  <p:cSld>
+    <p:spTree>
+      <p:nvGrpSpPr>
+        <p:cNvPr id="1" name="">
+          <a:extLst>
+            <a:ext uri="{FF2B5EF4-FFF2-40B4-BE49-F238E27FC236}">
+              <a16:creationId xmlns:a16="http://schemas.microsoft.com/office/drawing/2014/main" id="{218ACFA0-5B4E-FA01-649E-21A96E5F0F56}"/>
+            </a:ext>
+          </a:extLst>
+        </p:cNvPr>
+        <p:cNvGrpSpPr/>
+        <p:nvPr/>
+      </p:nvGrpSpPr>
+      <p:grpSpPr>
+        <a:xfrm>
+          <a:off x="0" y="0"/>
+          <a:ext cx="0" cy="0"/>
+          <a:chOff x="0" y="0"/>
+          <a:chExt cx="0" cy="0"/>
+        </a:xfrm>
+      </p:grpSpPr>
+      <p:sp>
+        <p:nvSpPr>
+          <p:cNvPr id="2" name="Title 1">
+            <a:extLst>
+              <a:ext uri="{FF2B5EF4-FFF2-40B4-BE49-F238E27FC236}">
+                <a16:creationId xmlns:a16="http://schemas.microsoft.com/office/drawing/2014/main" id="{67F390EA-6393-C0FA-3388-0BC4FBBB11FD}"/>
+              </a:ext>
+            </a:extLst>
+          </p:cNvPr>
+          <p:cNvSpPr>
+            <a:spLocks noGrp="1"/>
+          </p:cNvSpPr>
+          <p:nvPr>
+            <p:ph type="title"/>
+          </p:nvPr>
+        </p:nvSpPr>
+        <p:spPr/>
+        <p:txBody>
+          <a:bodyPr/>
+          <a:lstStyle/>
+          <a:p>
+            <a:r>
+              <a:rPr lang="en-US" dirty="0"/>
+              <a:t>Local vs. remote</a:t>
+            </a:r>
+          </a:p>
+        </p:txBody>
+      </p:sp>
+      <p:sp>
+        <p:nvSpPr>
+          <p:cNvPr id="3" name="Content Placeholder 2">
+            <a:extLst>
+              <a:ext uri="{FF2B5EF4-FFF2-40B4-BE49-F238E27FC236}">
+                <a16:creationId xmlns:a16="http://schemas.microsoft.com/office/drawing/2014/main" id="{B38E4B8B-DEF8-F1AA-3AE1-4614C7680F69}"/>
+              </a:ext>
+            </a:extLst>
+          </p:cNvPr>
+          <p:cNvSpPr>
+            <a:spLocks noGrp="1"/>
+          </p:cNvSpPr>
+          <p:nvPr>
+            <p:ph idx="1"/>
+          </p:nvPr>
+        </p:nvSpPr>
+        <p:spPr>
+          <a:xfrm>
+            <a:off x="838200" y="1825625"/>
+            <a:ext cx="10515600" cy="1325563"/>
+          </a:xfrm>
+        </p:spPr>
+        <p:txBody>
+          <a:bodyPr>
+            <a:normAutofit/>
+          </a:bodyPr>
+          <a:lstStyle/>
+          <a:p>
+            <a:pPr marL="0" indent="0">
+              <a:buNone/>
+            </a:pPr>
+            <a:r>
+              <a:rPr lang="en-US" dirty="0"/>
+              <a:t>Let’s talk about how your local (your computer) and remote (your GitHub) storage differs. </a:t>
+            </a:r>
+          </a:p>
+          <a:p>
+            <a:pPr marL="0" indent="0">
+              <a:buNone/>
+            </a:pPr>
+            <a:endParaRPr lang="en-US" dirty="0"/>
+          </a:p>
+          <a:p>
+            <a:pPr marL="0" indent="0">
+              <a:buNone/>
+            </a:pPr>
+            <a:endParaRPr lang="en-US" dirty="0">
+              <a:latin typeface="Andale Mono" panose="020B0509000000000004" pitchFamily="49" charset="0"/>
+            </a:endParaRPr>
+          </a:p>
+          <a:p>
+            <a:pPr marL="0" indent="0">
+              <a:buNone/>
+            </a:pPr>
+            <a:endParaRPr lang="en-US" dirty="0">
+              <a:latin typeface="Andale Mono" panose="020B0509000000000004" pitchFamily="49" charset="0"/>
+            </a:endParaRPr>
+          </a:p>
+        </p:txBody>
+      </p:sp>
+      <p:sp>
+        <p:nvSpPr>
+          <p:cNvPr id="4" name="Title 1">
+            <a:extLst>
+              <a:ext uri="{FF2B5EF4-FFF2-40B4-BE49-F238E27FC236}">
+                <a16:creationId xmlns:a16="http://schemas.microsoft.com/office/drawing/2014/main" id="{3E28BD36-8F26-E2C3-9BA9-01808FBAC0AA}"/>
+              </a:ext>
+            </a:extLst>
+          </p:cNvPr>
+          <p:cNvSpPr txBox="1">
+            <a:spLocks/>
+          </p:cNvSpPr>
+          <p:nvPr/>
+        </p:nvSpPr>
+        <p:spPr>
+          <a:xfrm>
+            <a:off x="838200" y="2915037"/>
+            <a:ext cx="10515600" cy="1325563"/>
+          </a:xfrm>
+          <a:prstGeom prst="rect">
+            <a:avLst/>
+          </a:prstGeom>
+        </p:spPr>
+        <p:txBody>
+          <a:bodyPr vert="horz" lIns="91440" tIns="45720" rIns="91440" bIns="45720" rtlCol="0" anchor="ctr">
+            <a:normAutofit/>
+          </a:bodyPr>
+          <a:lstStyle>
+            <a:lvl1pPr algn="l" defTabSz="914400" rtl="0" eaLnBrk="1" latinLnBrk="0" hangingPunct="1">
+              <a:lnSpc>
+                <a:spcPct val="90000"/>
+              </a:lnSpc>
+              <a:spcBef>
+                <a:spcPct val="0"/>
+              </a:spcBef>
+              <a:buNone/>
+              <a:defRPr sz="4400" kern="1200">
+                <a:solidFill>
+                  <a:schemeClr val="tx1"/>
+                </a:solidFill>
+                <a:latin typeface="+mj-lt"/>
+                <a:ea typeface="+mj-ea"/>
+                <a:cs typeface="+mj-cs"/>
+              </a:defRPr>
+            </a:lvl1pPr>
+          </a:lstStyle>
+          <a:p>
+            <a:r>
+              <a:rPr lang="en-US" dirty="0"/>
+              <a:t>Push, Pull, Fork, and Clone</a:t>
+            </a:r>
+          </a:p>
+        </p:txBody>
+      </p:sp>
+      <p:sp>
+        <p:nvSpPr>
+          <p:cNvPr id="5" name="Content Placeholder 2">
+            <a:extLst>
+              <a:ext uri="{FF2B5EF4-FFF2-40B4-BE49-F238E27FC236}">
+                <a16:creationId xmlns:a16="http://schemas.microsoft.com/office/drawing/2014/main" id="{5DD4F574-8C60-F4B1-9AA5-AEA56E14C8B9}"/>
+              </a:ext>
+            </a:extLst>
+          </p:cNvPr>
+          <p:cNvSpPr txBox="1">
+            <a:spLocks/>
+          </p:cNvSpPr>
+          <p:nvPr/>
+        </p:nvSpPr>
+        <p:spPr>
+          <a:xfrm>
+            <a:off x="838200" y="4375537"/>
+            <a:ext cx="10515600" cy="1325563"/>
+          </a:xfrm>
+          <a:prstGeom prst="rect">
+            <a:avLst/>
+          </a:prstGeom>
+        </p:spPr>
+        <p:txBody>
+          <a:bodyPr vert="horz" lIns="91440" tIns="45720" rIns="91440" bIns="45720" rtlCol="0">
+            <a:normAutofit/>
+          </a:bodyPr>
+          <a:lstStyle>
+            <a:lvl1pPr marL="228600" indent="-228600" algn="l" defTabSz="914400" rtl="0" eaLnBrk="1" latinLnBrk="0" hangingPunct="1">
+              <a:lnSpc>
+                <a:spcPct val="90000"/>
+              </a:lnSpc>
+              <a:spcBef>
+                <a:spcPts val="1000"/>
+              </a:spcBef>
+              <a:buFont typeface="Arial" panose="020B0604020202020204" pitchFamily="34" charset="0"/>
+              <a:buChar char="•"/>
+              <a:defRPr sz="2800" kern="1200">
+                <a:solidFill>
+                  <a:schemeClr val="tx1"/>
+                </a:solidFill>
+                <a:latin typeface="+mn-lt"/>
+                <a:ea typeface="+mn-ea"/>
+                <a:cs typeface="+mn-cs"/>
+              </a:defRPr>
+            </a:lvl1pPr>
+            <a:lvl2pPr marL="685800" indent="-228600" algn="l" defTabSz="914400" rtl="0" eaLnBrk="1" latinLnBrk="0" hangingPunct="1">
+              <a:lnSpc>
+                <a:spcPct val="90000"/>
+              </a:lnSpc>
+              <a:spcBef>
+                <a:spcPts val="500"/>
+              </a:spcBef>
+              <a:buFont typeface="Arial" panose="020B0604020202020204" pitchFamily="34" charset="0"/>
+              <a:buChar char="•"/>
+              <a:defRPr sz="2400" kern="1200">
+                <a:solidFill>
+                  <a:schemeClr val="tx1"/>
+                </a:solidFill>
+                <a:latin typeface="+mn-lt"/>
+                <a:ea typeface="+mn-ea"/>
+                <a:cs typeface="+mn-cs"/>
+              </a:defRPr>
+            </a:lvl2pPr>
+            <a:lvl3pPr marL="1143000" indent="-228600" algn="l" defTabSz="914400" rtl="0" eaLnBrk="1" latinLnBrk="0" hangingPunct="1">
+              <a:lnSpc>
+                <a:spcPct val="90000"/>
+              </a:lnSpc>
+              <a:spcBef>
+                <a:spcPts val="500"/>
+              </a:spcBef>
+              <a:buFont typeface="Arial" panose="020B0604020202020204" pitchFamily="34" charset="0"/>
+              <a:buChar char="•"/>
+              <a:defRPr sz="2000" kern="1200">
+                <a:solidFill>
+                  <a:schemeClr val="tx1"/>
+                </a:solidFill>
+                <a:latin typeface="+mn-lt"/>
+                <a:ea typeface="+mn-ea"/>
+                <a:cs typeface="+mn-cs"/>
+              </a:defRPr>
+            </a:lvl3pPr>
+            <a:lvl4pPr marL="1600200" indent="-228600" algn="l" defTabSz="914400" rtl="0" eaLnBrk="1" latinLnBrk="0" hangingPunct="1">
+              <a:lnSpc>
+                <a:spcPct val="90000"/>
+              </a:lnSpc>
+              <a:spcBef>
+                <a:spcPts val="500"/>
+              </a:spcBef>
+              <a:buFont typeface="Arial" panose="020B0604020202020204" pitchFamily="34" charset="0"/>
+              <a:buChar char="•"/>
+              <a:defRPr sz="1800" kern="1200">
+                <a:solidFill>
+                  <a:schemeClr val="tx1"/>
+                </a:solidFill>
+                <a:latin typeface="+mn-lt"/>
+                <a:ea typeface="+mn-ea"/>
+                <a:cs typeface="+mn-cs"/>
+              </a:defRPr>
+            </a:lvl4pPr>
+            <a:lvl5pPr marL="2057400" indent="-228600" algn="l" defTabSz="914400" rtl="0" eaLnBrk="1" latinLnBrk="0" hangingPunct="1">
+              <a:lnSpc>
+                <a:spcPct val="90000"/>
+              </a:lnSpc>
+              <a:spcBef>
+                <a:spcPts val="500"/>
+              </a:spcBef>
+              <a:buFont typeface="Arial" panose="020B0604020202020204" pitchFamily="34" charset="0"/>
+              <a:buChar char="•"/>
+              <a:defRPr sz="1800" kern="1200">
+                <a:solidFill>
+                  <a:schemeClr val="tx1"/>
+                </a:solidFill>
+                <a:latin typeface="+mn-lt"/>
+                <a:ea typeface="+mn-ea"/>
+                <a:cs typeface="+mn-cs"/>
+              </a:defRPr>
+            </a:lvl5pPr>
+            <a:lvl6pPr marL="2514600" indent="-228600" algn="l" defTabSz="914400" rtl="0" eaLnBrk="1" latinLnBrk="0" hangingPunct="1">
+              <a:lnSpc>
+                <a:spcPct val="90000"/>
+              </a:lnSpc>
+              <a:spcBef>
+                <a:spcPts val="500"/>
+              </a:spcBef>
+              <a:buFont typeface="Arial" panose="020B0604020202020204" pitchFamily="34" charset="0"/>
+              <a:buChar char="•"/>
+              <a:defRPr sz="1800" kern="1200">
+                <a:solidFill>
+                  <a:schemeClr val="tx1"/>
+                </a:solidFill>
+                <a:latin typeface="+mn-lt"/>
+                <a:ea typeface="+mn-ea"/>
+                <a:cs typeface="+mn-cs"/>
+              </a:defRPr>
+            </a:lvl6pPr>
+            <a:lvl7pPr marL="2971800" indent="-228600" algn="l" defTabSz="914400" rtl="0" eaLnBrk="1" latinLnBrk="0" hangingPunct="1">
+              <a:lnSpc>
+                <a:spcPct val="90000"/>
+              </a:lnSpc>
+              <a:spcBef>
+                <a:spcPts val="500"/>
+              </a:spcBef>
+              <a:buFont typeface="Arial" panose="020B0604020202020204" pitchFamily="34" charset="0"/>
+              <a:buChar char="•"/>
+              <a:defRPr sz="1800" kern="1200">
+                <a:solidFill>
+                  <a:schemeClr val="tx1"/>
+                </a:solidFill>
+                <a:latin typeface="+mn-lt"/>
+                <a:ea typeface="+mn-ea"/>
+                <a:cs typeface="+mn-cs"/>
+              </a:defRPr>
+            </a:lvl7pPr>
+            <a:lvl8pPr marL="3429000" indent="-228600" algn="l" defTabSz="914400" rtl="0" eaLnBrk="1" latinLnBrk="0" hangingPunct="1">
+              <a:lnSpc>
+                <a:spcPct val="90000"/>
+              </a:lnSpc>
+              <a:spcBef>
+                <a:spcPts val="500"/>
+              </a:spcBef>
+              <a:buFont typeface="Arial" panose="020B0604020202020204" pitchFamily="34" charset="0"/>
+              <a:buChar char="•"/>
+              <a:defRPr sz="1800" kern="1200">
+                <a:solidFill>
+                  <a:schemeClr val="tx1"/>
+                </a:solidFill>
+                <a:latin typeface="+mn-lt"/>
+                <a:ea typeface="+mn-ea"/>
+                <a:cs typeface="+mn-cs"/>
+              </a:defRPr>
+            </a:lvl8pPr>
+            <a:lvl9pPr marL="3886200" indent="-228600" algn="l" defTabSz="914400" rtl="0" eaLnBrk="1" latinLnBrk="0" hangingPunct="1">
+              <a:lnSpc>
+                <a:spcPct val="90000"/>
+              </a:lnSpc>
+              <a:spcBef>
+                <a:spcPts val="500"/>
+              </a:spcBef>
+              <a:buFont typeface="Arial" panose="020B0604020202020204" pitchFamily="34" charset="0"/>
+              <a:buChar char="•"/>
+              <a:defRPr sz="1800" kern="1200">
+                <a:solidFill>
+                  <a:schemeClr val="tx1"/>
+                </a:solidFill>
+                <a:latin typeface="+mn-lt"/>
+                <a:ea typeface="+mn-ea"/>
+                <a:cs typeface="+mn-cs"/>
+              </a:defRPr>
+            </a:lvl9pPr>
+          </a:lstStyle>
+          <a:p>
+            <a:pPr marL="0" indent="0">
+              <a:buFont typeface="Arial" panose="020B0604020202020204" pitchFamily="34" charset="0"/>
+              <a:buNone/>
+            </a:pPr>
+            <a:r>
+              <a:rPr lang="en-US" dirty="0"/>
+              <a:t>How to sync your remote and local repos, how to borrow code, how to collaborate with low risk vs. collaborate more seriously.</a:t>
+            </a:r>
+          </a:p>
+          <a:p>
+            <a:pPr marL="0" indent="0">
+              <a:buFont typeface="Arial" panose="020B0604020202020204" pitchFamily="34" charset="0"/>
+              <a:buNone/>
+            </a:pPr>
+            <a:endParaRPr lang="en-US" dirty="0"/>
+          </a:p>
+        </p:txBody>
+      </p:sp>
+    </p:spTree>
+    <p:extLst>
+      <p:ext uri="{BB962C8B-B14F-4D97-AF65-F5344CB8AC3E}">
+        <p14:creationId xmlns:p14="http://schemas.microsoft.com/office/powerpoint/2010/main" val="30339947"/>
+      </p:ext>
+    </p:extLst>
+  </p:cSld>
+  <p:clrMapOvr>
+    <a:masterClrMapping/>
+  </p:clrMapOvr>
+</p:sld>
+</file>
+
+<file path=ppt/slides/slide23.xml><?xml version="1.0" encoding="utf-8"?>
+<p:sld xmlns:a="http://schemas.openxmlformats.org/drawingml/2006/main" xmlns:r="http://schemas.openxmlformats.org/officeDocument/2006/relationships" xmlns:p="http://schemas.openxmlformats.org/presentationml/2006/main">
+  <p:cSld>
+    <p:spTree>
+      <p:nvGrpSpPr>
         <p:cNvPr id="1" name=""/>
         <p:cNvGrpSpPr/>
         <p:nvPr/>
@@ -5226,10 +5734,9 @@
               <a:t>rcsconsult</a:t>
             </a:r>
             <a:r>
-              <a:rPr lang="en-US"/>
+              <a:rPr lang="en-US" dirty="0"/>
               <a:t>. </a:t>
             </a:r>
-            <a:endParaRPr lang="en-US" dirty="0"/>
           </a:p>
           <a:p>
             <a:pPr marL="0" indent="0">
@@ -5273,7 +5780,13 @@
   <p:cSld>
     <p:spTree>
       <p:nvGrpSpPr>
-        <p:cNvPr id="1" name=""/>
+        <p:cNvPr id="1" name="">
+          <a:extLst>
+            <a:ext uri="{FF2B5EF4-FFF2-40B4-BE49-F238E27FC236}">
+              <a16:creationId xmlns:a16="http://schemas.microsoft.com/office/drawing/2014/main" id="{B223E780-115A-4357-7638-BF1B4921D8CA}"/>
+            </a:ext>
+          </a:extLst>
+        </p:cNvPr>
         <p:cNvGrpSpPr/>
         <p:nvPr/>
       </p:nvGrpSpPr>
@@ -5290,7 +5803,7 @@
           <p:cNvPr id="2" name="Title 1">
             <a:extLst>
               <a:ext uri="{FF2B5EF4-FFF2-40B4-BE49-F238E27FC236}">
-                <a16:creationId xmlns:a16="http://schemas.microsoft.com/office/drawing/2014/main" id="{7DEB63DD-3AD1-9A0E-4896-A6DB03BAD1C7}"/>
+                <a16:creationId xmlns:a16="http://schemas.microsoft.com/office/drawing/2014/main" id="{1E5C535C-9320-504A-3B19-3793E8E38347}"/>
               </a:ext>
             </a:extLst>
           </p:cNvPr>
@@ -5308,7 +5821,7 @@
           <a:p>
             <a:r>
               <a:rPr lang="en-US" dirty="0"/>
-              <a:t>Code to set up git on your laptop</a:t>
+              <a:t>Today’s lesson</a:t>
             </a:r>
           </a:p>
         </p:txBody>
@@ -5318,7 +5831,7 @@
           <p:cNvPr id="3" name="Content Placeholder 2">
             <a:extLst>
               <a:ext uri="{FF2B5EF4-FFF2-40B4-BE49-F238E27FC236}">
-                <a16:creationId xmlns:a16="http://schemas.microsoft.com/office/drawing/2014/main" id="{30BF350E-41A0-628E-2B24-07BB08DB5723}"/>
+                <a16:creationId xmlns:a16="http://schemas.microsoft.com/office/drawing/2014/main" id="{CF0A8618-CF62-B4F8-6081-34B70AD36674}"/>
               </a:ext>
             </a:extLst>
           </p:cNvPr>
@@ -5331,47 +5844,30 @@
         </p:nvSpPr>
         <p:spPr/>
         <p:txBody>
-          <a:bodyPr>
-            <a:normAutofit/>
-          </a:bodyPr>
-          <a:lstStyle/>
-          <a:p>
-            <a:pPr marL="0" indent="0">
-              <a:buNone/>
-            </a:pPr>
-            <a:r>
-              <a:rPr lang="en-US" sz="2400" b="0" dirty="0">
+          <a:bodyPr/>
+          <a:lstStyle/>
+          <a:p>
+            <a:pPr marL="0" indent="0">
+              <a:buNone/>
+            </a:pPr>
+            <a:r>
+              <a:rPr lang="en-US" dirty="0"/>
+              <a:t>My materials are adapted from this lesson: </a:t>
+            </a:r>
+            <a:r>
+              <a:rPr lang="en-US" sz="2800" dirty="0">
+                <a:solidFill>
+                  <a:srgbClr val="000000"/>
+                </a:solidFill>
                 <a:effectLst/>
+                <a:hlinkClick r:id="rId2"/>
               </a:rPr>
-              <a:t>Remember, the dollar sign is your command prompt in your command line shell. You might have a different prompt. You do not type the prompt when running these commands.</a:t>
-            </a:r>
-          </a:p>
-          <a:p>
-            <a:pPr marL="0" indent="0">
-              <a:buNone/>
-            </a:pPr>
-            <a:endParaRPr lang="en-US" sz="2400" dirty="0"/>
-          </a:p>
-          <a:p>
-            <a:pPr marL="0" indent="0">
-              <a:buNone/>
-            </a:pPr>
-            <a:r>
-              <a:rPr lang="en-US" sz="2400" b="0" dirty="0">
-                <a:effectLst/>
-              </a:rPr>
-              <a:t>Use the name that you want to appear alongside your code.</a:t>
-            </a:r>
-          </a:p>
-          <a:p>
-            <a:pPr marL="0" indent="0">
-              <a:buNone/>
-            </a:pPr>
-            <a:r>
-              <a:rPr lang="en-US" sz="2400" dirty="0"/>
-              <a:t>Use the same email address that you used for GitHub.</a:t>
-            </a:r>
-            <a:endParaRPr lang="en-US" sz="2400" b="0" dirty="0">
+              <a:t>https://swcarpentry.github.io/git-novice</a:t>
+            </a:r>
+            <a:endParaRPr lang="en-US" sz="2800" dirty="0">
+              <a:solidFill>
+                <a:srgbClr val="000000"/>
+              </a:solidFill>
               <a:effectLst/>
             </a:endParaRPr>
           </a:p>
@@ -5379,9 +5875,10 @@
             <a:pPr marL="0" indent="0">
               <a:buNone/>
             </a:pPr>
-            <a:endParaRPr lang="en-US" sz="2400" b="0" dirty="0">
-              <a:effectLst/>
-              <a:latin typeface="Andale Mono" panose="020B0509000000000004" pitchFamily="49" charset="0"/>
+            <a:endParaRPr lang="en-US" dirty="0">
+              <a:solidFill>
+                <a:srgbClr val="000000"/>
+              </a:solidFill>
             </a:endParaRPr>
           </a:p>
           <a:p>
@@ -5389,108 +5886,21 @@
               <a:buNone/>
             </a:pPr>
             <a:r>
-              <a:rPr lang="en-US" sz="2400" b="0" dirty="0">
-                <a:effectLst/>
-                <a:latin typeface="Andale Mono" panose="020B0509000000000004" pitchFamily="49" charset="0"/>
+              <a:rPr lang="en-US" dirty="0">
+                <a:solidFill>
+                  <a:srgbClr val="000000"/>
+                </a:solidFill>
               </a:rPr>
-              <a:t>$ git config --global </a:t>
-            </a:r>
-            <a:r>
-              <a:rPr lang="en-US" sz="2400" b="0" dirty="0" err="1">
-                <a:effectLst/>
-                <a:latin typeface="Andale Mono" panose="020B0509000000000004" pitchFamily="49" charset="0"/>
-              </a:rPr>
-              <a:t>user.name</a:t>
-            </a:r>
-            <a:r>
-              <a:rPr lang="en-US" sz="2400" b="0" dirty="0">
-                <a:effectLst/>
-                <a:latin typeface="Andale Mono" panose="020B0509000000000004" pitchFamily="49" charset="0"/>
-              </a:rPr>
-              <a:t> </a:t>
-            </a:r>
-            <a:r>
-              <a:rPr lang="en-US" sz="2400" b="0" dirty="0">
-                <a:solidFill>
-                  <a:srgbClr val="20794D"/>
-                </a:solidFill>
-                <a:effectLst/>
-                <a:latin typeface="Andale Mono" panose="020B0509000000000004" pitchFamily="49" charset="0"/>
-              </a:rPr>
-              <a:t>"Vlad Dracula"</a:t>
-            </a:r>
-            <a:r>
-              <a:rPr lang="en-US" sz="2400" dirty="0">
-                <a:latin typeface="Andale Mono" panose="020B0509000000000004" pitchFamily="49" charset="0"/>
-              </a:rPr>
-              <a:t> </a:t>
-            </a:r>
-          </a:p>
-          <a:p>
-            <a:pPr marL="0" indent="0">
-              <a:buNone/>
-            </a:pPr>
-            <a:r>
-              <a:rPr lang="en-US" sz="2400" b="0" dirty="0">
-                <a:effectLst/>
-                <a:latin typeface="Andale Mono" panose="020B0509000000000004" pitchFamily="49" charset="0"/>
-              </a:rPr>
-              <a:t>$ git config --global </a:t>
-            </a:r>
-            <a:r>
-              <a:rPr lang="en-US" sz="2400" b="0" dirty="0" err="1">
-                <a:effectLst/>
-                <a:latin typeface="Andale Mono" panose="020B0509000000000004" pitchFamily="49" charset="0"/>
-              </a:rPr>
-              <a:t>user.email</a:t>
-            </a:r>
-            <a:r>
-              <a:rPr lang="en-US" sz="2400" b="0" dirty="0">
-                <a:effectLst/>
-                <a:latin typeface="Andale Mono" panose="020B0509000000000004" pitchFamily="49" charset="0"/>
-              </a:rPr>
-              <a:t> </a:t>
-            </a:r>
-            <a:r>
-              <a:rPr lang="en-US" sz="2400" b="0" dirty="0">
-                <a:solidFill>
-                  <a:srgbClr val="20794D"/>
-                </a:solidFill>
-                <a:effectLst/>
-                <a:latin typeface="Andale Mono" panose="020B0509000000000004" pitchFamily="49" charset="0"/>
-              </a:rPr>
-              <a:t>"</a:t>
-            </a:r>
-            <a:r>
-              <a:rPr lang="en-US" sz="2400" b="0" dirty="0" err="1">
-                <a:solidFill>
-                  <a:srgbClr val="20794D"/>
-                </a:solidFill>
-                <a:effectLst/>
-                <a:latin typeface="Andale Mono" panose="020B0509000000000004" pitchFamily="49" charset="0"/>
-              </a:rPr>
-              <a:t>vlad@tran.sylvan.ia</a:t>
-            </a:r>
-            <a:r>
-              <a:rPr lang="en-US" sz="2400" b="0" dirty="0">
-                <a:solidFill>
-                  <a:srgbClr val="20794D"/>
-                </a:solidFill>
-                <a:effectLst/>
-                <a:latin typeface="Andale Mono" panose="020B0509000000000004" pitchFamily="49" charset="0"/>
-              </a:rPr>
-              <a:t>"</a:t>
-            </a:r>
-            <a:endParaRPr lang="en-US" sz="2400" dirty="0">
-              <a:latin typeface="Andale Mono" panose="020B0509000000000004" pitchFamily="49" charset="0"/>
-            </a:endParaRPr>
+              <a:t>To learn more functionalities of git, or to review what you’ve learned after this workshop, please check out that tutorial.</a:t>
+            </a:r>
+            <a:endParaRPr lang="en-US" dirty="0"/>
           </a:p>
         </p:txBody>
       </p:sp>
     </p:spTree>
     <p:extLst>
       <p:ext uri="{BB962C8B-B14F-4D97-AF65-F5344CB8AC3E}">
-        <p14:creationId xmlns:p14="http://schemas.microsoft.com/office/powerpoint/2010/main" val="3732740159"/>
+        <p14:creationId xmlns:p14="http://schemas.microsoft.com/office/powerpoint/2010/main" val="501263132"/>
       </p:ext>
     </p:extLst>
   </p:cSld>
@@ -5572,8 +5982,36 @@
               <a:buNone/>
             </a:pPr>
             <a:r>
+              <a:rPr lang="en-US" sz="2400" b="0" dirty="0">
+                <a:effectLst/>
+              </a:rPr>
+              <a:t>The dollar sign is your command prompt in your command line shell. You might have a different prompt instead of a dollar sign. You do not type the prompt when running these commands.</a:t>
+            </a:r>
+          </a:p>
+          <a:p>
+            <a:pPr marL="0" indent="0">
+              <a:buNone/>
+            </a:pPr>
+            <a:endParaRPr lang="en-US" sz="2400" dirty="0"/>
+          </a:p>
+          <a:p>
+            <a:pPr marL="0" indent="0">
+              <a:buNone/>
+            </a:pPr>
+            <a:r>
+              <a:rPr lang="en-US" sz="2400" b="0" dirty="0">
+                <a:effectLst/>
+              </a:rPr>
+              <a:t>Use the name that you want to appear alongside your code (not your GitHub name, unless you used your actual name as your GitHub name).</a:t>
+            </a:r>
+          </a:p>
+          <a:p>
+            <a:pPr marL="0" indent="0">
+              <a:buNone/>
+            </a:pPr>
+            <a:r>
               <a:rPr lang="en-US" sz="2400" dirty="0"/>
-              <a:t>Sometimes git might open up a text editor to help you add notes to keep track of your versions. You can set the text editor you want git to open. Here’s how to set it to vi:</a:t>
+              <a:t>Use the same email address that you used for GitHub.</a:t>
             </a:r>
             <a:endParaRPr lang="en-US" sz="2400" b="0" dirty="0">
               <a:effectLst/>
@@ -5597,45 +6035,104 @@
                 <a:effectLst/>
                 <a:latin typeface="Andale Mono" panose="020B0509000000000004" pitchFamily="49" charset="0"/>
               </a:rPr>
-              <a:t>$ </a:t>
-            </a:r>
-            <a:r>
-              <a:rPr lang="en-US" sz="2400" dirty="0">
+              <a:t>$ git config --global </a:t>
+            </a:r>
+            <a:r>
+              <a:rPr lang="en-US" sz="2400" b="0" dirty="0" err="1">
+                <a:effectLst/>
+                <a:latin typeface="Andale Mono" panose="020B0509000000000004" pitchFamily="49" charset="0"/>
+              </a:rPr>
+              <a:t>user.name</a:t>
+            </a:r>
+            <a:r>
+              <a:rPr lang="en-US" sz="2400" b="0" dirty="0">
+                <a:effectLst/>
+                <a:latin typeface="Andale Mono" panose="020B0509000000000004" pitchFamily="49" charset="0"/>
+              </a:rPr>
+              <a:t> </a:t>
+            </a:r>
+            <a:r>
+              <a:rPr lang="en-US" sz="2400" b="0" dirty="0">
                 <a:solidFill>
-                  <a:srgbClr val="000000"/>
+                  <a:srgbClr val="20794D"/>
                 </a:solidFill>
                 <a:effectLst/>
                 <a:latin typeface="Andale Mono" panose="020B0509000000000004" pitchFamily="49" charset="0"/>
               </a:rPr>
-              <a:t>git config --global </a:t>
-            </a:r>
-            <a:r>
-              <a:rPr lang="en-US" sz="2400" dirty="0" err="1">
+              <a:t>"Vlad Dracula"</a:t>
+            </a:r>
+            <a:r>
+              <a:rPr lang="en-US" sz="2400" dirty="0">
+                <a:latin typeface="Andale Mono" panose="020B0509000000000004" pitchFamily="49" charset="0"/>
+              </a:rPr>
+              <a:t> </a:t>
+            </a:r>
+          </a:p>
+          <a:p>
+            <a:pPr marL="0" indent="0">
+              <a:buNone/>
+            </a:pPr>
+            <a:r>
+              <a:rPr lang="en-US" sz="2400" b="0" dirty="0">
+                <a:effectLst/>
+                <a:latin typeface="Andale Mono" panose="020B0509000000000004" pitchFamily="49" charset="0"/>
+              </a:rPr>
+              <a:t>$ git config --global </a:t>
+            </a:r>
+            <a:r>
+              <a:rPr lang="en-US" sz="2400" b="0" dirty="0" err="1">
+                <a:effectLst/>
+                <a:latin typeface="Andale Mono" panose="020B0509000000000004" pitchFamily="49" charset="0"/>
+              </a:rPr>
+              <a:t>user.email</a:t>
+            </a:r>
+            <a:r>
+              <a:rPr lang="en-US" sz="2400" b="0" dirty="0">
+                <a:effectLst/>
+                <a:latin typeface="Andale Mono" panose="020B0509000000000004" pitchFamily="49" charset="0"/>
+              </a:rPr>
+              <a:t> </a:t>
+            </a:r>
+            <a:r>
+              <a:rPr lang="en-US" sz="2400" b="0" dirty="0">
                 <a:solidFill>
-                  <a:srgbClr val="000000"/>
+                  <a:srgbClr val="20794D"/>
                 </a:solidFill>
                 <a:effectLst/>
                 <a:latin typeface="Andale Mono" panose="020B0509000000000004" pitchFamily="49" charset="0"/>
               </a:rPr>
-              <a:t>core.editor</a:t>
-            </a:r>
-            <a:r>
-              <a:rPr lang="en-US" sz="2400" dirty="0">
+              <a:t>"</a:t>
+            </a:r>
+            <a:r>
+              <a:rPr lang="en-US" sz="2400" b="0" dirty="0" err="1">
                 <a:solidFill>
-                  <a:srgbClr val="000000"/>
+                  <a:srgbClr val="20794D"/>
                 </a:solidFill>
                 <a:effectLst/>
                 <a:latin typeface="Andale Mono" panose="020B0509000000000004" pitchFamily="49" charset="0"/>
               </a:rPr>
-              <a:t> "vi"</a:t>
-            </a:r>
+              <a:t>vlad@tran.sylvan.ia</a:t>
+            </a:r>
+            <a:r>
+              <a:rPr lang="en-US" sz="2400" b="0" dirty="0">
+                <a:solidFill>
+                  <a:srgbClr val="20794D"/>
+                </a:solidFill>
+                <a:effectLst/>
+                <a:latin typeface="Andale Mono" panose="020B0509000000000004" pitchFamily="49" charset="0"/>
+              </a:rPr>
+              <a:t>"</a:t>
+            </a:r>
+            <a:endParaRPr lang="en-US" sz="2400" dirty="0">
+              <a:latin typeface="Andale Mono" panose="020B0509000000000004" pitchFamily="49" charset="0"/>
+            </a:endParaRPr>
           </a:p>
         </p:txBody>
       </p:sp>
     </p:spTree>
     <p:extLst>
       <p:ext uri="{BB962C8B-B14F-4D97-AF65-F5344CB8AC3E}">
-        <p14:creationId xmlns:p14="http://schemas.microsoft.com/office/powerpoint/2010/main" val="2799035925"/>
+        <p14:creationId xmlns:p14="http://schemas.microsoft.com/office/powerpoint/2010/main" val="3732740159"/>
       </p:ext>
     </p:extLst>
   </p:cSld>
@@ -5718,7 +6215,7 @@
             </a:pPr>
             <a:r>
               <a:rPr lang="en-US" sz="2400" dirty="0"/>
-              <a:t>Because Macs and PCs use slightly different hidden characters to represent line endings, you want git to treat them the same. We can run this code to do that.</a:t>
+              <a:t>Sometimes git might open up a text editor to help you add notes to keep track of your versions. You can set the text editor you want git to open. Here’s how to set it to vi:</a:t>
             </a:r>
             <a:endParaRPr lang="en-US" sz="2400" b="0" dirty="0">
               <a:effectLst/>
@@ -5738,57 +6235,12 @@
               <a:buNone/>
             </a:pPr>
             <a:r>
-              <a:rPr lang="en-US" sz="2400" dirty="0">
-                <a:latin typeface="Andale Mono" panose="020B0509000000000004" pitchFamily="49" charset="0"/>
-              </a:rPr>
-              <a:t>ON A MAC</a:t>
-            </a:r>
-            <a:endParaRPr lang="en-US" sz="2400" b="0" dirty="0">
-              <a:effectLst/>
-              <a:latin typeface="Andale Mono" panose="020B0509000000000004" pitchFamily="49" charset="0"/>
-            </a:endParaRPr>
-          </a:p>
-          <a:p>
-            <a:pPr marL="0" indent="0">
-              <a:buNone/>
-            </a:pPr>
-            <a:r>
               <a:rPr lang="en-US" sz="2400" b="0" dirty="0">
                 <a:effectLst/>
                 <a:latin typeface="Andale Mono" panose="020B0509000000000004" pitchFamily="49" charset="0"/>
               </a:rPr>
-              <a:t>$ git config --global </a:t>
-            </a:r>
-            <a:r>
-              <a:rPr lang="en-US" sz="2400" b="0" dirty="0" err="1">
-                <a:effectLst/>
-                <a:latin typeface="Andale Mono" panose="020B0509000000000004" pitchFamily="49" charset="0"/>
-              </a:rPr>
-              <a:t>core.autocrlf</a:t>
-            </a:r>
-            <a:r>
-              <a:rPr lang="en-US" sz="2400" b="0" dirty="0">
-                <a:effectLst/>
-                <a:latin typeface="Andale Mono" panose="020B0509000000000004" pitchFamily="49" charset="0"/>
-              </a:rPr>
-              <a:t> input</a:t>
-            </a:r>
-          </a:p>
-          <a:p>
-            <a:pPr marL="0" indent="0">
-              <a:buNone/>
-            </a:pPr>
-            <a:endParaRPr lang="en-US" sz="2400" dirty="0">
-              <a:solidFill>
-                <a:srgbClr val="000000"/>
-              </a:solidFill>
-              <a:latin typeface="Andale Mono" panose="020B0509000000000004" pitchFamily="49" charset="0"/>
-            </a:endParaRPr>
-          </a:p>
-          <a:p>
-            <a:pPr marL="0" indent="0">
-              <a:buNone/>
-            </a:pPr>
+              <a:t>$ </a:t>
+            </a:r>
             <a:r>
               <a:rPr lang="en-US" sz="2400" dirty="0">
                 <a:solidFill>
@@ -5797,57 +6249,79 @@
                 <a:effectLst/>
                 <a:latin typeface="Andale Mono" panose="020B0509000000000004" pitchFamily="49" charset="0"/>
               </a:rPr>
-              <a:t>ON A PC</a:t>
-            </a:r>
-          </a:p>
-          <a:p>
-            <a:pPr marL="0" indent="0">
-              <a:buNone/>
-            </a:pPr>
+              <a:t>git config --global </a:t>
+            </a:r>
+            <a:r>
+              <a:rPr lang="en-US" sz="2400" dirty="0" err="1">
+                <a:solidFill>
+                  <a:srgbClr val="000000"/>
+                </a:solidFill>
+                <a:effectLst/>
+                <a:latin typeface="Andale Mono" panose="020B0509000000000004" pitchFamily="49" charset="0"/>
+              </a:rPr>
+              <a:t>core.editor</a:t>
+            </a:r>
             <a:r>
               <a:rPr lang="en-US" sz="2400" dirty="0">
                 <a:solidFill>
                   <a:srgbClr val="000000"/>
                 </a:solidFill>
-                <a:latin typeface="Andale Mono" panose="020B0509000000000004" pitchFamily="49" charset="0"/>
-              </a:rPr>
-              <a:t>$ </a:t>
-            </a:r>
-            <a:r>
-              <a:rPr lang="en-US" sz="2400" b="0" dirty="0">
                 <a:effectLst/>
                 <a:latin typeface="Andale Mono" panose="020B0509000000000004" pitchFamily="49" charset="0"/>
               </a:rPr>
-              <a:t>git config --global </a:t>
-            </a:r>
-            <a:r>
-              <a:rPr lang="en-US" sz="2400" b="0" dirty="0" err="1">
-                <a:effectLst/>
-                <a:latin typeface="Andale Mono" panose="020B0509000000000004" pitchFamily="49" charset="0"/>
-              </a:rPr>
-              <a:t>core.autocrlf</a:t>
-            </a:r>
-            <a:r>
-              <a:rPr lang="en-US" sz="2400" b="0" dirty="0">
-                <a:effectLst/>
-                <a:latin typeface="Andale Mono" panose="020B0509000000000004" pitchFamily="49" charset="0"/>
-              </a:rPr>
-              <a:t> false</a:t>
-            </a:r>
+              <a:t> "vi”</a:t>
+            </a:r>
+          </a:p>
+          <a:p>
+            <a:pPr marL="0" indent="0">
+              <a:buNone/>
+            </a:pPr>
             <a:endParaRPr lang="en-US" sz="2400" dirty="0">
               <a:solidFill>
                 <a:srgbClr val="000000"/>
               </a:solidFill>
-              <a:effectLst/>
               <a:latin typeface="Andale Mono" panose="020B0509000000000004" pitchFamily="49" charset="0"/>
             </a:endParaRPr>
+          </a:p>
+          <a:p>
+            <a:pPr marL="0" indent="0">
+              <a:buNone/>
+            </a:pPr>
+            <a:r>
+              <a:rPr lang="en-US" sz="2400" dirty="0">
+                <a:solidFill>
+                  <a:srgbClr val="000000"/>
+                </a:solidFill>
+                <a:effectLst/>
+              </a:rPr>
+              <a:t>Here’s a list of other text editors, and the commands to run to set them as your default: </a:t>
+            </a:r>
+            <a:r>
+              <a:rPr lang="en-US" sz="2400" dirty="0">
+                <a:solidFill>
+                  <a:srgbClr val="000000"/>
+                </a:solidFill>
+                <a:effectLst/>
+                <a:hlinkClick r:id="rId2"/>
+              </a:rPr>
+              <a:t>https://swcarpentry.github.io/git-novice/02-setup.html#line-endings</a:t>
+            </a:r>
+            <a:r>
+              <a:rPr lang="en-US" sz="2400" dirty="0">
+                <a:solidFill>
+                  <a:srgbClr val="000000"/>
+                </a:solidFill>
+                <a:effectLst/>
+              </a:rPr>
+              <a:t> </a:t>
+            </a:r>
           </a:p>
         </p:txBody>
       </p:sp>
     </p:spTree>
     <p:extLst>
       <p:ext uri="{BB962C8B-B14F-4D97-AF65-F5344CB8AC3E}">
-        <p14:creationId xmlns:p14="http://schemas.microsoft.com/office/powerpoint/2010/main" val="570654892"/>
+        <p14:creationId xmlns:p14="http://schemas.microsoft.com/office/powerpoint/2010/main" val="2799035925"/>
       </p:ext>
     </p:extLst>
   </p:cSld>
@@ -5897,7 +6371,7 @@
           <a:p>
             <a:r>
               <a:rPr lang="en-US" dirty="0"/>
-              <a:t>Adding an SSH key to your laptop</a:t>
+              <a:t>Code to set up git on your laptop</a:t>
             </a:r>
           </a:p>
         </p:txBody>
@@ -5921,7 +6395,7 @@
         <p:spPr/>
         <p:txBody>
           <a:bodyPr>
-            <a:normAutofit lnSpcReduction="10000"/>
+            <a:normAutofit/>
           </a:bodyPr>
           <a:lstStyle/>
           <a:p>
@@ -5930,41 +6404,7 @@
             </a:pPr>
             <a:r>
               <a:rPr lang="en-US" sz="2400" dirty="0"/>
-              <a:t>This is complicated, but you have to do it to use GitHub. GitHub takes security very seriously, and so should you!</a:t>
-            </a:r>
-          </a:p>
-          <a:p>
-            <a:pPr marL="0" indent="0">
-              <a:buNone/>
-            </a:pPr>
-            <a:endParaRPr lang="en-US" sz="2400" b="0" dirty="0">
-              <a:effectLst/>
-            </a:endParaRPr>
-          </a:p>
-          <a:p>
-            <a:pPr marL="0" indent="0">
-              <a:buNone/>
-            </a:pPr>
-            <a:r>
-              <a:rPr lang="en-US" sz="2400" dirty="0"/>
-              <a:t>Before we start – you will be asked to create a passphrase, not a password. It should be something like a sentence, though any real sentence can be recreated by a LLM, as we’ve learned, and used by a professional hacker. If you want to create a stronger password, it should be truly random words in a truly random order. But also you need to remember it in case you need it.</a:t>
-            </a:r>
-          </a:p>
-          <a:p>
-            <a:pPr marL="0" indent="0">
-              <a:buNone/>
-            </a:pPr>
-            <a:endParaRPr lang="en-US" sz="2400" b="0" dirty="0">
-              <a:effectLst/>
-            </a:endParaRPr>
-          </a:p>
-          <a:p>
-            <a:pPr marL="0" indent="0">
-              <a:buNone/>
-            </a:pPr>
-            <a:r>
-              <a:rPr lang="en-US" sz="2400" dirty="0"/>
-              <a:t>You will also get the option to type your passphrase in every time you save changes to your code or not on your own laptop. You’ll need to decide this in the next few minutes.</a:t>
+              <a:t>Because Macs and PCs use slightly different hidden characters to represent line endings, you want git to treat them the same. We can run this code to do that.</a:t>
             </a:r>
             <a:endParaRPr lang="en-US" sz="2400" b="0" dirty="0">
               <a:effectLst/>
@@ -5979,12 +6419,121 @@
               <a:latin typeface="Andale Mono" panose="020B0509000000000004" pitchFamily="49" charset="0"/>
             </a:endParaRPr>
           </a:p>
+          <a:p>
+            <a:pPr marL="0" indent="0">
+              <a:buNone/>
+            </a:pPr>
+            <a:r>
+              <a:rPr lang="en-US" sz="2400" dirty="0">
+                <a:latin typeface="Andale Mono" panose="020B0509000000000004" pitchFamily="49" charset="0"/>
+              </a:rPr>
+              <a:t>ON A MAC</a:t>
+            </a:r>
+            <a:endParaRPr lang="en-US" sz="2400" b="0" dirty="0">
+              <a:effectLst/>
+              <a:latin typeface="Andale Mono" panose="020B0509000000000004" pitchFamily="49" charset="0"/>
+            </a:endParaRPr>
+          </a:p>
+          <a:p>
+            <a:pPr marL="0" indent="0">
+              <a:buNone/>
+            </a:pPr>
+            <a:r>
+              <a:rPr lang="en-US" sz="2400" b="0" dirty="0">
+                <a:effectLst/>
+                <a:latin typeface="Andale Mono" panose="020B0509000000000004" pitchFamily="49" charset="0"/>
+              </a:rPr>
+              <a:t>$ git config --global </a:t>
+            </a:r>
+            <a:r>
+              <a:rPr lang="en-US" sz="2400" b="0" dirty="0" err="1">
+                <a:effectLst/>
+                <a:latin typeface="Andale Mono" panose="020B0509000000000004" pitchFamily="49" charset="0"/>
+              </a:rPr>
+              <a:t>core.autocrlf</a:t>
+            </a:r>
+            <a:r>
+              <a:rPr lang="en-US" sz="2400" b="0" dirty="0">
+                <a:effectLst/>
+                <a:latin typeface="Andale Mono" panose="020B0509000000000004" pitchFamily="49" charset="0"/>
+              </a:rPr>
+              <a:t> input</a:t>
+            </a:r>
+          </a:p>
+          <a:p>
+            <a:pPr marL="0" indent="0">
+              <a:buNone/>
+            </a:pPr>
+            <a:endParaRPr lang="en-US" sz="2400" dirty="0">
+              <a:solidFill>
+                <a:srgbClr val="000000"/>
+              </a:solidFill>
+              <a:latin typeface="Andale Mono" panose="020B0509000000000004" pitchFamily="49" charset="0"/>
+            </a:endParaRPr>
+          </a:p>
+          <a:p>
+            <a:pPr marL="0" indent="0">
+              <a:buNone/>
+            </a:pPr>
+            <a:r>
+              <a:rPr lang="en-US" sz="2400" dirty="0">
+                <a:solidFill>
+                  <a:srgbClr val="000000"/>
+                </a:solidFill>
+                <a:effectLst/>
+                <a:latin typeface="Andale Mono" panose="020B0509000000000004" pitchFamily="49" charset="0"/>
+              </a:rPr>
+              <a:t>ON A PC</a:t>
+            </a:r>
+          </a:p>
+          <a:p>
+            <a:pPr marL="0" indent="0">
+              <a:buNone/>
+            </a:pPr>
+            <a:r>
+              <a:rPr lang="en-US" sz="2400" dirty="0">
+                <a:solidFill>
+                  <a:srgbClr val="000000"/>
+                </a:solidFill>
+                <a:latin typeface="Andale Mono" panose="020B0509000000000004" pitchFamily="49" charset="0"/>
+              </a:rPr>
+              <a:t>$ </a:t>
+            </a:r>
+            <a:r>
+              <a:rPr lang="en-US" sz="2400" b="0" dirty="0">
+                <a:effectLst/>
+                <a:latin typeface="Andale Mono" panose="020B0509000000000004" pitchFamily="49" charset="0"/>
+              </a:rPr>
+              <a:t>git config --global </a:t>
+            </a:r>
+            <a:r>
+              <a:rPr lang="en-US" sz="2400" b="0" dirty="0" err="1">
+                <a:effectLst/>
+                <a:latin typeface="Andale Mono" panose="020B0509000000000004" pitchFamily="49" charset="0"/>
+              </a:rPr>
+              <a:t>core.autocrlf</a:t>
+            </a:r>
+            <a:r>
+              <a:rPr lang="en-US" sz="2400" b="0" dirty="0">
+                <a:effectLst/>
+                <a:latin typeface="Andale Mono" panose="020B0509000000000004" pitchFamily="49" charset="0"/>
+              </a:rPr>
+              <a:t> false</a:t>
+            </a:r>
+            <a:endParaRPr lang="en-US" sz="2400" dirty="0">
+              <a:solidFill>
+                <a:srgbClr val="000000"/>
+              </a:solidFill>
+              <a:effectLst/>
+              <a:latin typeface="Andale Mono" panose="020B0509000000000004" pitchFamily="49" charset="0"/>
+            </a:endParaRPr>
+          </a:p>
         </p:txBody>
       </p:sp>
     </p:spTree>
     <p:extLst>
       <p:ext uri="{BB962C8B-B14F-4D97-AF65-F5344CB8AC3E}">
-        <p14:creationId xmlns:p14="http://schemas.microsoft.com/office/powerpoint/2010/main" val="1072366984"/>
+        <p14:creationId xmlns:p14="http://schemas.microsoft.com/office/powerpoint/2010/main" val="570654892"/>
       </p:ext>
     </p:extLst>
   </p:cSld>
@@ -6034,7 +6583,7 @@
           <a:p>
             <a:r>
               <a:rPr lang="en-US" dirty="0"/>
-              <a:t>Adding an SSH key to your laptop</a:t>
+              <a:t>Configuring 2FA (Two-Factor Authentication)</a:t>
             </a:r>
           </a:p>
         </p:txBody>
@@ -6055,10 +6604,15 @@
             <p:ph idx="1"/>
           </p:nvPr>
         </p:nvSpPr>
-        <p:spPr/>
+        <p:spPr>
+          <a:xfrm>
+            <a:off x="838200" y="1825625"/>
+            <a:ext cx="10515600" cy="4667250"/>
+          </a:xfrm>
+        </p:spPr>
         <p:txBody>
           <a:bodyPr>
-            <a:normAutofit fontScale="92500" lnSpcReduction="10000"/>
+            <a:normAutofit fontScale="92500" lnSpcReduction="20000"/>
           </a:bodyPr>
           <a:lstStyle/>
           <a:p>
@@ -6066,78 +6620,88 @@
               <a:buNone/>
             </a:pPr>
             <a:r>
-              <a:rPr lang="en-US" sz="2400" b="0" dirty="0">
+              <a:rPr lang="en-US" sz="2400" dirty="0"/>
+              <a:t>This is a little complicated, but you have to do it to use GitHub. GitHub takes security very seriously, and so should you!</a:t>
+            </a:r>
+          </a:p>
+          <a:p>
+            <a:pPr marL="0" indent="0">
+              <a:buNone/>
+            </a:pPr>
+            <a:endParaRPr lang="en-US" sz="2400" b="0" dirty="0">
+              <a:effectLst/>
+            </a:endParaRPr>
+          </a:p>
+          <a:p>
+            <a:pPr marL="0" indent="0">
+              <a:buNone/>
+            </a:pPr>
+            <a:r>
+              <a:rPr lang="en-US" sz="2400" dirty="0"/>
+              <a:t>The best way to do this is to use a time-based one-time password (TOTP) application on your phone, like </a:t>
+            </a:r>
+            <a:r>
+              <a:rPr lang="en-US" sz="2400" b="1" dirty="0"/>
+              <a:t>Duo Mobile</a:t>
+            </a:r>
+            <a:r>
+              <a:rPr lang="en-US" sz="2400" dirty="0"/>
+              <a:t>, the same app most people use for 2FA for Northwestern log-ins.  </a:t>
+            </a:r>
+          </a:p>
+          <a:p>
+            <a:pPr marL="0" indent="0">
+              <a:buNone/>
+            </a:pPr>
+            <a:r>
+              <a:rPr lang="en-US" sz="2400" dirty="0">
                 <a:effectLst/>
               </a:rPr>
-              <a:t>Go to:</a:t>
-            </a:r>
-          </a:p>
-          <a:p>
-            <a:pPr marL="0" indent="0">
-              <a:buNone/>
-            </a:pPr>
-            <a:r>
-              <a:rPr lang="en-US" sz="2400" b="0" dirty="0">
+              <a:t>Go to </a:t>
+            </a:r>
+            <a:r>
+              <a:rPr lang="en-US" sz="2400" dirty="0">
                 <a:effectLst/>
                 <a:hlinkClick r:id="rId2"/>
               </a:rPr>
-              <a:t>https://docs.github.com/en/authentication/connecting-to-github-with-ssh/checking-for-existing-ssh-keys</a:t>
-            </a:r>
+              <a:t>https://docs.github.com/en/authentication/securing-your-account-with-two-factor-authentication-2fa/configuring-two-factor-authentication#configuring-two-factor-authentication-using-a-totp-app</a:t>
+            </a:r>
+            <a:r>
+              <a:rPr lang="en-US" sz="2400" dirty="0">
+                <a:effectLst/>
+              </a:rPr>
+              <a:t> and follow the instructions to link your GitHub account to Duo Mobile. </a:t>
+            </a:r>
+          </a:p>
+          <a:p>
+            <a:pPr marL="0" indent="0">
+              <a:buNone/>
+            </a:pPr>
             <a:endParaRPr lang="en-US" sz="2400" dirty="0"/>
           </a:p>
           <a:p>
             <a:pPr marL="0" indent="0">
               <a:buNone/>
             </a:pPr>
-            <a:endParaRPr lang="en-US" sz="2400" dirty="0"/>
-          </a:p>
-          <a:p>
-            <a:r>
-              <a:rPr lang="en-US" sz="2400" dirty="0"/>
-              <a:t>You are going to work through four of the steps listed in the menu on the left: Check for existing SSH keys, Generate new SSH key, Add a new SSH key, and Test your SSH connection.</a:t>
-            </a:r>
-          </a:p>
-          <a:p>
-            <a:r>
-              <a:rPr lang="en-US" sz="2400" dirty="0"/>
-              <a:t>Choose Mac, Windows, or Linux on each page.</a:t>
-            </a:r>
-          </a:p>
-          <a:p>
-            <a:r>
-              <a:rPr lang="en-US" sz="2400" dirty="0"/>
-              <a:t>PC users – it assumes you’re using </a:t>
-            </a:r>
-            <a:r>
-              <a:rPr lang="en-US" sz="2400" dirty="0" err="1"/>
-              <a:t>GitBash</a:t>
-            </a:r>
-            <a:r>
-              <a:rPr lang="en-US" sz="2400" dirty="0"/>
-              <a:t>. WSL users: </a:t>
-            </a:r>
-            <a:r>
-              <a:rPr lang="en-US" sz="1900" dirty="0">
+            <a:r>
+              <a:rPr lang="en-US" sz="2400" dirty="0">
+                <a:effectLst/>
+              </a:rPr>
+              <a:t>If you can’t use Duo Mobile, you can use text message for 2FA. Follow these instructions: </a:t>
+            </a:r>
+            <a:r>
+              <a:rPr lang="en-US" sz="2400" dirty="0">
+                <a:effectLst/>
                 <a:hlinkClick r:id="rId3"/>
               </a:rPr>
-              <a:t>https://www.thatamazingprogrammer.com/setting-up-ssh-keys-for-github-using-wsl-and-keychain</a:t>
-            </a:r>
-            <a:r>
-              <a:rPr lang="en-US" sz="1900" dirty="0"/>
-              <a:t> </a:t>
-            </a:r>
-          </a:p>
-          <a:p>
-            <a:r>
-              <a:rPr lang="en-US" sz="2400" dirty="0"/>
-              <a:t>When you are done, put the green post-it note up on your computer. If you need help, put up the pink post-it note.</a:t>
-            </a:r>
-          </a:p>
-          <a:p>
-            <a:pPr marL="0" indent="0">
-              <a:buNone/>
-            </a:pPr>
-            <a:endParaRPr lang="en-US" sz="2400" dirty="0"/>
+              <a:t>https://docs.github.com/en/authentication/securing-your-account-with-two-factor-authentication-2fa/configuring-two-factor-authentication#configuring-two-factor-authentication-using-text-messages</a:t>
+            </a:r>
+            <a:r>
+              <a:rPr lang="en-US" sz="2400" dirty="0">
+                <a:effectLst/>
+              </a:rPr>
+              <a:t>. Text message 2FA does not work in every country, so it is not the preferred method. </a:t>
+            </a:r>
           </a:p>
           <a:p>
             <a:pPr marL="0" indent="0">
@@ -6145,14 +6709,7 @@
             </a:pPr>
             <a:endParaRPr lang="en-US" sz="2400" b="0" dirty="0">
               <a:effectLst/>
-            </a:endParaRPr>
-          </a:p>
-          <a:p>
-            <a:pPr marL="0" indent="0">
-              <a:buNone/>
-            </a:pPr>
-            <a:endParaRPr lang="en-US" sz="2400" b="0" dirty="0">
-              <a:effectLst/>
+              <a:latin typeface="Andale Mono" panose="020B0509000000000004" pitchFamily="49" charset="0"/>
             </a:endParaRPr>
           </a:p>
         </p:txBody>
@@ -6160,7 +6717,7 @@
     </p:spTree>
     <p:extLst>
       <p:ext uri="{BB962C8B-B14F-4D97-AF65-F5344CB8AC3E}">
-        <p14:creationId xmlns:p14="http://schemas.microsoft.com/office/powerpoint/2010/main" val="2245516524"/>
+        <p14:creationId xmlns:p14="http://schemas.microsoft.com/office/powerpoint/2010/main" val="1072366984"/>
       </p:ext>
     </p:extLst>
   </p:cSld>
@@ -6203,16 +6760,27 @@
             <p:ph type="title"/>
           </p:nvPr>
         </p:nvSpPr>
-        <p:spPr/>
+        <p:spPr>
+          <a:xfrm>
+            <a:off x="838200" y="365125"/>
+            <a:ext cx="10515600" cy="3794280"/>
+          </a:xfrm>
+        </p:spPr>
         <p:txBody>
           <a:bodyPr/>
           <a:lstStyle/>
           <a:p>
             <a:r>
-              <a:rPr lang="en-US"/>
+              <a:rPr lang="en-US" dirty="0"/>
               <a:t>Version control</a:t>
             </a:r>
-            <a:endParaRPr lang="en-US" dirty="0"/>
+            <a:br>
+              <a:rPr lang="en-US" dirty="0"/>
+            </a:br>
+            <a:r>
+              <a:rPr lang="en-US" dirty="0"/>
+              <a:t>(whiteboard talk)</a:t>
+            </a:r>
           </a:p>
         </p:txBody>
       </p:sp>

</xml_diff>

<commit_message>
added link for troubleshooting 2FA push on some Macs
</commit_message>
<xml_diff>
--- a/introGit.pptx
+++ b/introGit.pptx
@@ -4409,7 +4409,7 @@
             </a:r>
             <a:r>
               <a:rPr lang="en-US" dirty="0"/>
-              <a:t> file: “The two moons may be a problem for Wolfman”. Then add the change to the staging area and make a commit. Don’t forget to name your commit with a message. Also, these commits will get added to your GitHub later today, where they will exist forever, so don’t name your commit something you’ll regret.</a:t>
+              <a:t> file: “The two moons may be a problem for Wolfman”. Then check git status. Then add the change to the staging area and make a commit. Don’t forget to name your commit with a message. Also, these commits will get added to your GitHub later today, where they will exist forever, so don’t name your commit something you’ll regret.</a:t>
             </a:r>
           </a:p>
           <a:p>
@@ -4634,6 +4634,38 @@
               <a:rPr lang="en-US" dirty="0"/>
               <a:t>Use the same name (“planets”). Make it public (for now).</a:t>
             </a:r>
+          </a:p>
+          <a:p>
+            <a:pPr marL="0" indent="0">
+              <a:buNone/>
+            </a:pPr>
+            <a:endParaRPr lang="en-US" dirty="0"/>
+          </a:p>
+          <a:p>
+            <a:pPr marL="0" indent="0">
+              <a:buNone/>
+            </a:pPr>
+            <a:r>
+              <a:rPr lang="en-US" dirty="0"/>
+              <a:t>If you are on a Mac and you have issues with pushing your repo, try following these instructions: </a:t>
+            </a:r>
+            <a:r>
+              <a:rPr lang="en-US" dirty="0">
+                <a:hlinkClick r:id="rId2"/>
+              </a:rPr>
+              <a:t>https://ginnyfahs.medium.com</a:t>
+            </a:r>
+            <a:r>
+              <a:rPr lang="en-US">
+                <a:hlinkClick r:id="rId2"/>
+              </a:rPr>
+              <a:t>/github-error-authentication-failed-from-command-line-3a545bfd0ca8</a:t>
+            </a:r>
+            <a:r>
+              <a:rPr lang="en-US"/>
+              <a:t> </a:t>
+            </a:r>
+            <a:endParaRPr lang="en-US" dirty="0"/>
           </a:p>
         </p:txBody>
       </p:sp>

</xml_diff>